<commit_message>
added Data model.adf added model_recruitement_manager.adf
</commit_message>
<xml_diff>
--- a/doc/Umsetzungskonzept.pptx
+++ b/doc/Umsetzungskonzept.pptx
@@ -110,7 +110,7 @@
   </p:defaultTextStyle>
   <p:extLst>
     <p:ext uri="{EFAFB233-063F-42B5-8137-9DF3F51BA10A}">
-      <p15:sldGuideLst xmlns:p15="http://schemas.microsoft.com/office/powerpoint/2012/main">
+      <p15:sldGuideLst xmlns:p15="http://schemas.microsoft.com/office/powerpoint/2012/main" xmlns="">
         <p15:guide id="1" orient="horz" pos="2160" userDrawn="1">
           <p15:clr>
             <a:srgbClr val="A4A3A4"/>
@@ -153,7 +153,7 @@
           <p:cNvPr id="2" name="Titel 1">
             <a:extLst>
               <a:ext uri="{FF2B5EF4-FFF2-40B4-BE49-F238E27FC236}">
-                <a16:creationId xmlns:a16="http://schemas.microsoft.com/office/drawing/2014/main" id="{D061B3DA-8F74-4353-BE59-BCA637AF2915}"/>
+                <a16:creationId xmlns:a16="http://schemas.microsoft.com/office/drawing/2014/main" xmlns="" id="{D061B3DA-8F74-4353-BE59-BCA637AF2915}"/>
               </a:ext>
             </a:extLst>
           </p:cNvPr>
@@ -190,7 +190,7 @@
           <p:cNvPr id="3" name="Untertitel 2">
             <a:extLst>
               <a:ext uri="{FF2B5EF4-FFF2-40B4-BE49-F238E27FC236}">
-                <a16:creationId xmlns:a16="http://schemas.microsoft.com/office/drawing/2014/main" id="{6BB3A449-9849-4B78-8435-52ED9AEF17EA}"/>
+                <a16:creationId xmlns:a16="http://schemas.microsoft.com/office/drawing/2014/main" xmlns="" id="{6BB3A449-9849-4B78-8435-52ED9AEF17EA}"/>
               </a:ext>
             </a:extLst>
           </p:cNvPr>
@@ -260,7 +260,7 @@
           <p:cNvPr id="4" name="Datumsplatzhalter 3">
             <a:extLst>
               <a:ext uri="{FF2B5EF4-FFF2-40B4-BE49-F238E27FC236}">
-                <a16:creationId xmlns:a16="http://schemas.microsoft.com/office/drawing/2014/main" id="{7C64B7EC-477D-4E27-9EBE-B061028515A7}"/>
+                <a16:creationId xmlns:a16="http://schemas.microsoft.com/office/drawing/2014/main" xmlns="" id="{7C64B7EC-477D-4E27-9EBE-B061028515A7}"/>
               </a:ext>
             </a:extLst>
           </p:cNvPr>
@@ -289,7 +289,7 @@
           <p:cNvPr id="5" name="Fußzeilenplatzhalter 4">
             <a:extLst>
               <a:ext uri="{FF2B5EF4-FFF2-40B4-BE49-F238E27FC236}">
-                <a16:creationId xmlns:a16="http://schemas.microsoft.com/office/drawing/2014/main" id="{EFEB97E7-0952-40C3-88F0-324BA9CF57DB}"/>
+                <a16:creationId xmlns:a16="http://schemas.microsoft.com/office/drawing/2014/main" xmlns="" id="{EFEB97E7-0952-40C3-88F0-324BA9CF57DB}"/>
               </a:ext>
             </a:extLst>
           </p:cNvPr>
@@ -314,7 +314,7 @@
           <p:cNvPr id="6" name="Foliennummernplatzhalter 5">
             <a:extLst>
               <a:ext uri="{FF2B5EF4-FFF2-40B4-BE49-F238E27FC236}">
-                <a16:creationId xmlns:a16="http://schemas.microsoft.com/office/drawing/2014/main" id="{824F3E94-62A4-422B-BECB-E802F15B9DF2}"/>
+                <a16:creationId xmlns:a16="http://schemas.microsoft.com/office/drawing/2014/main" xmlns="" id="{824F3E94-62A4-422B-BECB-E802F15B9DF2}"/>
               </a:ext>
             </a:extLst>
           </p:cNvPr>
@@ -332,7 +332,7 @@
           <a:p>
             <a:fld id="{CC7C2768-A18B-433E-B893-6D4C6EFBD913}" type="slidenum">
               <a:rPr lang="de-DE" smtClean="0"/>
-              <a:t>‹Nr.›</a:t>
+              <a:t>‹#›</a:t>
             </a:fld>
             <a:endParaRPr lang="de-DE"/>
           </a:p>
@@ -373,7 +373,7 @@
           <p:cNvPr id="2" name="Titel 1">
             <a:extLst>
               <a:ext uri="{FF2B5EF4-FFF2-40B4-BE49-F238E27FC236}">
-                <a16:creationId xmlns:a16="http://schemas.microsoft.com/office/drawing/2014/main" id="{6766B5BE-B052-4AF9-A426-02B1FDDFABE7}"/>
+                <a16:creationId xmlns:a16="http://schemas.microsoft.com/office/drawing/2014/main" xmlns="" id="{6766B5BE-B052-4AF9-A426-02B1FDDFABE7}"/>
               </a:ext>
             </a:extLst>
           </p:cNvPr>
@@ -401,7 +401,7 @@
           <p:cNvPr id="3" name="Vertikaler Textplatzhalter 2">
             <a:extLst>
               <a:ext uri="{FF2B5EF4-FFF2-40B4-BE49-F238E27FC236}">
-                <a16:creationId xmlns:a16="http://schemas.microsoft.com/office/drawing/2014/main" id="{D791A322-A88E-43B2-B0DE-E9BD6D5C0B64}"/>
+                <a16:creationId xmlns:a16="http://schemas.microsoft.com/office/drawing/2014/main" xmlns="" id="{D791A322-A88E-43B2-B0DE-E9BD6D5C0B64}"/>
               </a:ext>
             </a:extLst>
           </p:cNvPr>
@@ -458,7 +458,7 @@
           <p:cNvPr id="4" name="Datumsplatzhalter 3">
             <a:extLst>
               <a:ext uri="{FF2B5EF4-FFF2-40B4-BE49-F238E27FC236}">
-                <a16:creationId xmlns:a16="http://schemas.microsoft.com/office/drawing/2014/main" id="{4323A4EE-7352-448F-B45F-6E2F442E3A26}"/>
+                <a16:creationId xmlns:a16="http://schemas.microsoft.com/office/drawing/2014/main" xmlns="" id="{4323A4EE-7352-448F-B45F-6E2F442E3A26}"/>
               </a:ext>
             </a:extLst>
           </p:cNvPr>
@@ -487,7 +487,7 @@
           <p:cNvPr id="5" name="Fußzeilenplatzhalter 4">
             <a:extLst>
               <a:ext uri="{FF2B5EF4-FFF2-40B4-BE49-F238E27FC236}">
-                <a16:creationId xmlns:a16="http://schemas.microsoft.com/office/drawing/2014/main" id="{7AA7FC36-EF95-4049-8103-C3D410E1A0B0}"/>
+                <a16:creationId xmlns:a16="http://schemas.microsoft.com/office/drawing/2014/main" xmlns="" id="{7AA7FC36-EF95-4049-8103-C3D410E1A0B0}"/>
               </a:ext>
             </a:extLst>
           </p:cNvPr>
@@ -512,7 +512,7 @@
           <p:cNvPr id="6" name="Foliennummernplatzhalter 5">
             <a:extLst>
               <a:ext uri="{FF2B5EF4-FFF2-40B4-BE49-F238E27FC236}">
-                <a16:creationId xmlns:a16="http://schemas.microsoft.com/office/drawing/2014/main" id="{325AC3E6-ED27-4C5B-9771-707C72E2E7B3}"/>
+                <a16:creationId xmlns:a16="http://schemas.microsoft.com/office/drawing/2014/main" xmlns="" id="{325AC3E6-ED27-4C5B-9771-707C72E2E7B3}"/>
               </a:ext>
             </a:extLst>
           </p:cNvPr>
@@ -530,7 +530,7 @@
           <a:p>
             <a:fld id="{CC7C2768-A18B-433E-B893-6D4C6EFBD913}" type="slidenum">
               <a:rPr lang="de-DE" smtClean="0"/>
-              <a:t>‹Nr.›</a:t>
+              <a:t>‹#›</a:t>
             </a:fld>
             <a:endParaRPr lang="de-DE"/>
           </a:p>
@@ -571,7 +571,7 @@
           <p:cNvPr id="2" name="Vertikaler Titel 1">
             <a:extLst>
               <a:ext uri="{FF2B5EF4-FFF2-40B4-BE49-F238E27FC236}">
-                <a16:creationId xmlns:a16="http://schemas.microsoft.com/office/drawing/2014/main" id="{D6AB55B8-996D-481F-9EC7-20261196C017}"/>
+                <a16:creationId xmlns:a16="http://schemas.microsoft.com/office/drawing/2014/main" xmlns="" id="{D6AB55B8-996D-481F-9EC7-20261196C017}"/>
               </a:ext>
             </a:extLst>
           </p:cNvPr>
@@ -604,7 +604,7 @@
           <p:cNvPr id="3" name="Vertikaler Textplatzhalter 2">
             <a:extLst>
               <a:ext uri="{FF2B5EF4-FFF2-40B4-BE49-F238E27FC236}">
-                <a16:creationId xmlns:a16="http://schemas.microsoft.com/office/drawing/2014/main" id="{6467E91C-F934-4124-9A43-FB8703CEEF1F}"/>
+                <a16:creationId xmlns:a16="http://schemas.microsoft.com/office/drawing/2014/main" xmlns="" id="{6467E91C-F934-4124-9A43-FB8703CEEF1F}"/>
               </a:ext>
             </a:extLst>
           </p:cNvPr>
@@ -666,7 +666,7 @@
           <p:cNvPr id="4" name="Datumsplatzhalter 3">
             <a:extLst>
               <a:ext uri="{FF2B5EF4-FFF2-40B4-BE49-F238E27FC236}">
-                <a16:creationId xmlns:a16="http://schemas.microsoft.com/office/drawing/2014/main" id="{BD88F6E2-276E-4416-9AD3-907B7AB2C296}"/>
+                <a16:creationId xmlns:a16="http://schemas.microsoft.com/office/drawing/2014/main" xmlns="" id="{BD88F6E2-276E-4416-9AD3-907B7AB2C296}"/>
               </a:ext>
             </a:extLst>
           </p:cNvPr>
@@ -695,7 +695,7 @@
           <p:cNvPr id="5" name="Fußzeilenplatzhalter 4">
             <a:extLst>
               <a:ext uri="{FF2B5EF4-FFF2-40B4-BE49-F238E27FC236}">
-                <a16:creationId xmlns:a16="http://schemas.microsoft.com/office/drawing/2014/main" id="{1FEF2775-FFEB-4386-BE29-AE8496912D1E}"/>
+                <a16:creationId xmlns:a16="http://schemas.microsoft.com/office/drawing/2014/main" xmlns="" id="{1FEF2775-FFEB-4386-BE29-AE8496912D1E}"/>
               </a:ext>
             </a:extLst>
           </p:cNvPr>
@@ -720,7 +720,7 @@
           <p:cNvPr id="6" name="Foliennummernplatzhalter 5">
             <a:extLst>
               <a:ext uri="{FF2B5EF4-FFF2-40B4-BE49-F238E27FC236}">
-                <a16:creationId xmlns:a16="http://schemas.microsoft.com/office/drawing/2014/main" id="{9A4A1912-BB24-4E62-A78A-7D74815D7BAF}"/>
+                <a16:creationId xmlns:a16="http://schemas.microsoft.com/office/drawing/2014/main" xmlns="" id="{9A4A1912-BB24-4E62-A78A-7D74815D7BAF}"/>
               </a:ext>
             </a:extLst>
           </p:cNvPr>
@@ -738,7 +738,7 @@
           <a:p>
             <a:fld id="{CC7C2768-A18B-433E-B893-6D4C6EFBD913}" type="slidenum">
               <a:rPr lang="de-DE" smtClean="0"/>
-              <a:t>‹Nr.›</a:t>
+              <a:t>‹#›</a:t>
             </a:fld>
             <a:endParaRPr lang="de-DE"/>
           </a:p>
@@ -779,7 +779,7 @@
           <p:cNvPr id="2" name="Titel 1">
             <a:extLst>
               <a:ext uri="{FF2B5EF4-FFF2-40B4-BE49-F238E27FC236}">
-                <a16:creationId xmlns:a16="http://schemas.microsoft.com/office/drawing/2014/main" id="{18340099-0194-4E98-A333-F4F14D555A4B}"/>
+                <a16:creationId xmlns:a16="http://schemas.microsoft.com/office/drawing/2014/main" xmlns="" id="{18340099-0194-4E98-A333-F4F14D555A4B}"/>
               </a:ext>
             </a:extLst>
           </p:cNvPr>
@@ -807,7 +807,7 @@
           <p:cNvPr id="3" name="Inhaltsplatzhalter 2">
             <a:extLst>
               <a:ext uri="{FF2B5EF4-FFF2-40B4-BE49-F238E27FC236}">
-                <a16:creationId xmlns:a16="http://schemas.microsoft.com/office/drawing/2014/main" id="{55CCD6D7-AB89-4F01-B102-B7561E644782}"/>
+                <a16:creationId xmlns:a16="http://schemas.microsoft.com/office/drawing/2014/main" xmlns="" id="{55CCD6D7-AB89-4F01-B102-B7561E644782}"/>
               </a:ext>
             </a:extLst>
           </p:cNvPr>
@@ -864,7 +864,7 @@
           <p:cNvPr id="4" name="Datumsplatzhalter 3">
             <a:extLst>
               <a:ext uri="{FF2B5EF4-FFF2-40B4-BE49-F238E27FC236}">
-                <a16:creationId xmlns:a16="http://schemas.microsoft.com/office/drawing/2014/main" id="{7392FC64-F3E3-4789-985B-83FBC0521761}"/>
+                <a16:creationId xmlns:a16="http://schemas.microsoft.com/office/drawing/2014/main" xmlns="" id="{7392FC64-F3E3-4789-985B-83FBC0521761}"/>
               </a:ext>
             </a:extLst>
           </p:cNvPr>
@@ -893,7 +893,7 @@
           <p:cNvPr id="5" name="Fußzeilenplatzhalter 4">
             <a:extLst>
               <a:ext uri="{FF2B5EF4-FFF2-40B4-BE49-F238E27FC236}">
-                <a16:creationId xmlns:a16="http://schemas.microsoft.com/office/drawing/2014/main" id="{05E620CB-59A0-4C39-9A94-FA252D100044}"/>
+                <a16:creationId xmlns:a16="http://schemas.microsoft.com/office/drawing/2014/main" xmlns="" id="{05E620CB-59A0-4C39-9A94-FA252D100044}"/>
               </a:ext>
             </a:extLst>
           </p:cNvPr>
@@ -918,7 +918,7 @@
           <p:cNvPr id="6" name="Foliennummernplatzhalter 5">
             <a:extLst>
               <a:ext uri="{FF2B5EF4-FFF2-40B4-BE49-F238E27FC236}">
-                <a16:creationId xmlns:a16="http://schemas.microsoft.com/office/drawing/2014/main" id="{DFDC505F-6DB4-44E1-BC89-410559D89B20}"/>
+                <a16:creationId xmlns:a16="http://schemas.microsoft.com/office/drawing/2014/main" xmlns="" id="{DFDC505F-6DB4-44E1-BC89-410559D89B20}"/>
               </a:ext>
             </a:extLst>
           </p:cNvPr>
@@ -936,7 +936,7 @@
           <a:p>
             <a:fld id="{CC7C2768-A18B-433E-B893-6D4C6EFBD913}" type="slidenum">
               <a:rPr lang="de-DE" smtClean="0"/>
-              <a:t>‹Nr.›</a:t>
+              <a:t>‹#›</a:t>
             </a:fld>
             <a:endParaRPr lang="de-DE"/>
           </a:p>
@@ -977,7 +977,7 @@
           <p:cNvPr id="2" name="Titel 1">
             <a:extLst>
               <a:ext uri="{FF2B5EF4-FFF2-40B4-BE49-F238E27FC236}">
-                <a16:creationId xmlns:a16="http://schemas.microsoft.com/office/drawing/2014/main" id="{C116037E-8854-4482-B242-50F9D256B966}"/>
+                <a16:creationId xmlns:a16="http://schemas.microsoft.com/office/drawing/2014/main" xmlns="" id="{C116037E-8854-4482-B242-50F9D256B966}"/>
               </a:ext>
             </a:extLst>
           </p:cNvPr>
@@ -1014,7 +1014,7 @@
           <p:cNvPr id="3" name="Textplatzhalter 2">
             <a:extLst>
               <a:ext uri="{FF2B5EF4-FFF2-40B4-BE49-F238E27FC236}">
-                <a16:creationId xmlns:a16="http://schemas.microsoft.com/office/drawing/2014/main" id="{84AF97B9-3D16-4380-87B8-B7CB91D673F3}"/>
+                <a16:creationId xmlns:a16="http://schemas.microsoft.com/office/drawing/2014/main" xmlns="" id="{84AF97B9-3D16-4380-87B8-B7CB91D673F3}"/>
               </a:ext>
             </a:extLst>
           </p:cNvPr>
@@ -1139,7 +1139,7 @@
           <p:cNvPr id="4" name="Datumsplatzhalter 3">
             <a:extLst>
               <a:ext uri="{FF2B5EF4-FFF2-40B4-BE49-F238E27FC236}">
-                <a16:creationId xmlns:a16="http://schemas.microsoft.com/office/drawing/2014/main" id="{F3B06C37-1A5D-423E-A0AC-604A7B92BA92}"/>
+                <a16:creationId xmlns:a16="http://schemas.microsoft.com/office/drawing/2014/main" xmlns="" id="{F3B06C37-1A5D-423E-A0AC-604A7B92BA92}"/>
               </a:ext>
             </a:extLst>
           </p:cNvPr>
@@ -1168,7 +1168,7 @@
           <p:cNvPr id="5" name="Fußzeilenplatzhalter 4">
             <a:extLst>
               <a:ext uri="{FF2B5EF4-FFF2-40B4-BE49-F238E27FC236}">
-                <a16:creationId xmlns:a16="http://schemas.microsoft.com/office/drawing/2014/main" id="{DB091C73-BADF-4FF1-BEAA-2DF1A6F699CB}"/>
+                <a16:creationId xmlns:a16="http://schemas.microsoft.com/office/drawing/2014/main" xmlns="" id="{DB091C73-BADF-4FF1-BEAA-2DF1A6F699CB}"/>
               </a:ext>
             </a:extLst>
           </p:cNvPr>
@@ -1193,7 +1193,7 @@
           <p:cNvPr id="6" name="Foliennummernplatzhalter 5">
             <a:extLst>
               <a:ext uri="{FF2B5EF4-FFF2-40B4-BE49-F238E27FC236}">
-                <a16:creationId xmlns:a16="http://schemas.microsoft.com/office/drawing/2014/main" id="{B060111A-C751-449A-AC1A-E52709694D24}"/>
+                <a16:creationId xmlns:a16="http://schemas.microsoft.com/office/drawing/2014/main" xmlns="" id="{B060111A-C751-449A-AC1A-E52709694D24}"/>
               </a:ext>
             </a:extLst>
           </p:cNvPr>
@@ -1211,7 +1211,7 @@
           <a:p>
             <a:fld id="{CC7C2768-A18B-433E-B893-6D4C6EFBD913}" type="slidenum">
               <a:rPr lang="de-DE" smtClean="0"/>
-              <a:t>‹Nr.›</a:t>
+              <a:t>‹#›</a:t>
             </a:fld>
             <a:endParaRPr lang="de-DE"/>
           </a:p>
@@ -1252,7 +1252,7 @@
           <p:cNvPr id="2" name="Titel 1">
             <a:extLst>
               <a:ext uri="{FF2B5EF4-FFF2-40B4-BE49-F238E27FC236}">
-                <a16:creationId xmlns:a16="http://schemas.microsoft.com/office/drawing/2014/main" id="{23E7C38D-5101-4E0A-A426-E25AED265425}"/>
+                <a16:creationId xmlns:a16="http://schemas.microsoft.com/office/drawing/2014/main" xmlns="" id="{23E7C38D-5101-4E0A-A426-E25AED265425}"/>
               </a:ext>
             </a:extLst>
           </p:cNvPr>
@@ -1280,7 +1280,7 @@
           <p:cNvPr id="3" name="Inhaltsplatzhalter 2">
             <a:extLst>
               <a:ext uri="{FF2B5EF4-FFF2-40B4-BE49-F238E27FC236}">
-                <a16:creationId xmlns:a16="http://schemas.microsoft.com/office/drawing/2014/main" id="{E76AF9EA-FA1B-44E8-999A-498CE366E8FF}"/>
+                <a16:creationId xmlns:a16="http://schemas.microsoft.com/office/drawing/2014/main" xmlns="" id="{E76AF9EA-FA1B-44E8-999A-498CE366E8FF}"/>
               </a:ext>
             </a:extLst>
           </p:cNvPr>
@@ -1342,7 +1342,7 @@
           <p:cNvPr id="4" name="Inhaltsplatzhalter 3">
             <a:extLst>
               <a:ext uri="{FF2B5EF4-FFF2-40B4-BE49-F238E27FC236}">
-                <a16:creationId xmlns:a16="http://schemas.microsoft.com/office/drawing/2014/main" id="{03205778-A2BF-40E1-BB8D-EE6D837C80C3}"/>
+                <a16:creationId xmlns:a16="http://schemas.microsoft.com/office/drawing/2014/main" xmlns="" id="{03205778-A2BF-40E1-BB8D-EE6D837C80C3}"/>
               </a:ext>
             </a:extLst>
           </p:cNvPr>
@@ -1404,7 +1404,7 @@
           <p:cNvPr id="5" name="Datumsplatzhalter 4">
             <a:extLst>
               <a:ext uri="{FF2B5EF4-FFF2-40B4-BE49-F238E27FC236}">
-                <a16:creationId xmlns:a16="http://schemas.microsoft.com/office/drawing/2014/main" id="{55F4D511-734D-4DEF-96B5-DA0154ABC7B4}"/>
+                <a16:creationId xmlns:a16="http://schemas.microsoft.com/office/drawing/2014/main" xmlns="" id="{55F4D511-734D-4DEF-96B5-DA0154ABC7B4}"/>
               </a:ext>
             </a:extLst>
           </p:cNvPr>
@@ -1433,7 +1433,7 @@
           <p:cNvPr id="6" name="Fußzeilenplatzhalter 5">
             <a:extLst>
               <a:ext uri="{FF2B5EF4-FFF2-40B4-BE49-F238E27FC236}">
-                <a16:creationId xmlns:a16="http://schemas.microsoft.com/office/drawing/2014/main" id="{B6B573E2-B5E3-48B9-A52F-69CA708C0071}"/>
+                <a16:creationId xmlns:a16="http://schemas.microsoft.com/office/drawing/2014/main" xmlns="" id="{B6B573E2-B5E3-48B9-A52F-69CA708C0071}"/>
               </a:ext>
             </a:extLst>
           </p:cNvPr>
@@ -1458,7 +1458,7 @@
           <p:cNvPr id="7" name="Foliennummernplatzhalter 6">
             <a:extLst>
               <a:ext uri="{FF2B5EF4-FFF2-40B4-BE49-F238E27FC236}">
-                <a16:creationId xmlns:a16="http://schemas.microsoft.com/office/drawing/2014/main" id="{D8E4563F-59F5-409F-BEA5-98DCB3F77248}"/>
+                <a16:creationId xmlns:a16="http://schemas.microsoft.com/office/drawing/2014/main" xmlns="" id="{D8E4563F-59F5-409F-BEA5-98DCB3F77248}"/>
               </a:ext>
             </a:extLst>
           </p:cNvPr>
@@ -1476,7 +1476,7 @@
           <a:p>
             <a:fld id="{CC7C2768-A18B-433E-B893-6D4C6EFBD913}" type="slidenum">
               <a:rPr lang="de-DE" smtClean="0"/>
-              <a:t>‹Nr.›</a:t>
+              <a:t>‹#›</a:t>
             </a:fld>
             <a:endParaRPr lang="de-DE"/>
           </a:p>
@@ -1517,7 +1517,7 @@
           <p:cNvPr id="2" name="Titel 1">
             <a:extLst>
               <a:ext uri="{FF2B5EF4-FFF2-40B4-BE49-F238E27FC236}">
-                <a16:creationId xmlns:a16="http://schemas.microsoft.com/office/drawing/2014/main" id="{BFF57A70-8E1A-4019-9AEF-02DBCBE089E7}"/>
+                <a16:creationId xmlns:a16="http://schemas.microsoft.com/office/drawing/2014/main" xmlns="" id="{BFF57A70-8E1A-4019-9AEF-02DBCBE089E7}"/>
               </a:ext>
             </a:extLst>
           </p:cNvPr>
@@ -1550,7 +1550,7 @@
           <p:cNvPr id="3" name="Textplatzhalter 2">
             <a:extLst>
               <a:ext uri="{FF2B5EF4-FFF2-40B4-BE49-F238E27FC236}">
-                <a16:creationId xmlns:a16="http://schemas.microsoft.com/office/drawing/2014/main" id="{3A6DEFD1-54FA-4A30-AF0F-393ACD4711A9}"/>
+                <a16:creationId xmlns:a16="http://schemas.microsoft.com/office/drawing/2014/main" xmlns="" id="{3A6DEFD1-54FA-4A30-AF0F-393ACD4711A9}"/>
               </a:ext>
             </a:extLst>
           </p:cNvPr>
@@ -1621,7 +1621,7 @@
           <p:cNvPr id="4" name="Inhaltsplatzhalter 3">
             <a:extLst>
               <a:ext uri="{FF2B5EF4-FFF2-40B4-BE49-F238E27FC236}">
-                <a16:creationId xmlns:a16="http://schemas.microsoft.com/office/drawing/2014/main" id="{1C1C8A58-E806-4889-837C-AA000C97A3EC}"/>
+                <a16:creationId xmlns:a16="http://schemas.microsoft.com/office/drawing/2014/main" xmlns="" id="{1C1C8A58-E806-4889-837C-AA000C97A3EC}"/>
               </a:ext>
             </a:extLst>
           </p:cNvPr>
@@ -1683,7 +1683,7 @@
           <p:cNvPr id="5" name="Textplatzhalter 4">
             <a:extLst>
               <a:ext uri="{FF2B5EF4-FFF2-40B4-BE49-F238E27FC236}">
-                <a16:creationId xmlns:a16="http://schemas.microsoft.com/office/drawing/2014/main" id="{4B104CA3-D00E-4DBB-9231-432B19949238}"/>
+                <a16:creationId xmlns:a16="http://schemas.microsoft.com/office/drawing/2014/main" xmlns="" id="{4B104CA3-D00E-4DBB-9231-432B19949238}"/>
               </a:ext>
             </a:extLst>
           </p:cNvPr>
@@ -1754,7 +1754,7 @@
           <p:cNvPr id="6" name="Inhaltsplatzhalter 5">
             <a:extLst>
               <a:ext uri="{FF2B5EF4-FFF2-40B4-BE49-F238E27FC236}">
-                <a16:creationId xmlns:a16="http://schemas.microsoft.com/office/drawing/2014/main" id="{B3ABE76F-94D8-4D1C-B160-11DFA84559AD}"/>
+                <a16:creationId xmlns:a16="http://schemas.microsoft.com/office/drawing/2014/main" xmlns="" id="{B3ABE76F-94D8-4D1C-B160-11DFA84559AD}"/>
               </a:ext>
             </a:extLst>
           </p:cNvPr>
@@ -1816,7 +1816,7 @@
           <p:cNvPr id="7" name="Datumsplatzhalter 6">
             <a:extLst>
               <a:ext uri="{FF2B5EF4-FFF2-40B4-BE49-F238E27FC236}">
-                <a16:creationId xmlns:a16="http://schemas.microsoft.com/office/drawing/2014/main" id="{52C482B0-2C80-47A2-9C9C-04816258A1F4}"/>
+                <a16:creationId xmlns:a16="http://schemas.microsoft.com/office/drawing/2014/main" xmlns="" id="{52C482B0-2C80-47A2-9C9C-04816258A1F4}"/>
               </a:ext>
             </a:extLst>
           </p:cNvPr>
@@ -1845,7 +1845,7 @@
           <p:cNvPr id="8" name="Fußzeilenplatzhalter 7">
             <a:extLst>
               <a:ext uri="{FF2B5EF4-FFF2-40B4-BE49-F238E27FC236}">
-                <a16:creationId xmlns:a16="http://schemas.microsoft.com/office/drawing/2014/main" id="{00126AA8-A7C3-4CD9-8255-F10DEC2BC898}"/>
+                <a16:creationId xmlns:a16="http://schemas.microsoft.com/office/drawing/2014/main" xmlns="" id="{00126AA8-A7C3-4CD9-8255-F10DEC2BC898}"/>
               </a:ext>
             </a:extLst>
           </p:cNvPr>
@@ -1870,7 +1870,7 @@
           <p:cNvPr id="9" name="Foliennummernplatzhalter 8">
             <a:extLst>
               <a:ext uri="{FF2B5EF4-FFF2-40B4-BE49-F238E27FC236}">
-                <a16:creationId xmlns:a16="http://schemas.microsoft.com/office/drawing/2014/main" id="{7EC796C2-DE5C-4F6F-972B-E52692DAE279}"/>
+                <a16:creationId xmlns:a16="http://schemas.microsoft.com/office/drawing/2014/main" xmlns="" id="{7EC796C2-DE5C-4F6F-972B-E52692DAE279}"/>
               </a:ext>
             </a:extLst>
           </p:cNvPr>
@@ -1888,7 +1888,7 @@
           <a:p>
             <a:fld id="{CC7C2768-A18B-433E-B893-6D4C6EFBD913}" type="slidenum">
               <a:rPr lang="de-DE" smtClean="0"/>
-              <a:t>‹Nr.›</a:t>
+              <a:t>‹#›</a:t>
             </a:fld>
             <a:endParaRPr lang="de-DE"/>
           </a:p>
@@ -1929,7 +1929,7 @@
           <p:cNvPr id="2" name="Titel 1">
             <a:extLst>
               <a:ext uri="{FF2B5EF4-FFF2-40B4-BE49-F238E27FC236}">
-                <a16:creationId xmlns:a16="http://schemas.microsoft.com/office/drawing/2014/main" id="{F2AD03BE-54C5-410D-89C4-F888EB32D88B}"/>
+                <a16:creationId xmlns:a16="http://schemas.microsoft.com/office/drawing/2014/main" xmlns="" id="{F2AD03BE-54C5-410D-89C4-F888EB32D88B}"/>
               </a:ext>
             </a:extLst>
           </p:cNvPr>
@@ -1957,7 +1957,7 @@
           <p:cNvPr id="3" name="Datumsplatzhalter 2">
             <a:extLst>
               <a:ext uri="{FF2B5EF4-FFF2-40B4-BE49-F238E27FC236}">
-                <a16:creationId xmlns:a16="http://schemas.microsoft.com/office/drawing/2014/main" id="{AC2D5DB5-30DD-495E-A383-6399709D5DB5}"/>
+                <a16:creationId xmlns:a16="http://schemas.microsoft.com/office/drawing/2014/main" xmlns="" id="{AC2D5DB5-30DD-495E-A383-6399709D5DB5}"/>
               </a:ext>
             </a:extLst>
           </p:cNvPr>
@@ -1986,7 +1986,7 @@
           <p:cNvPr id="4" name="Fußzeilenplatzhalter 3">
             <a:extLst>
               <a:ext uri="{FF2B5EF4-FFF2-40B4-BE49-F238E27FC236}">
-                <a16:creationId xmlns:a16="http://schemas.microsoft.com/office/drawing/2014/main" id="{8BFFE002-AF6A-4D55-ABFA-846F92ECDB47}"/>
+                <a16:creationId xmlns:a16="http://schemas.microsoft.com/office/drawing/2014/main" xmlns="" id="{8BFFE002-AF6A-4D55-ABFA-846F92ECDB47}"/>
               </a:ext>
             </a:extLst>
           </p:cNvPr>
@@ -2011,7 +2011,7 @@
           <p:cNvPr id="5" name="Foliennummernplatzhalter 4">
             <a:extLst>
               <a:ext uri="{FF2B5EF4-FFF2-40B4-BE49-F238E27FC236}">
-                <a16:creationId xmlns:a16="http://schemas.microsoft.com/office/drawing/2014/main" id="{A064B767-0C67-4E78-8E02-6E4F4D6E0D0D}"/>
+                <a16:creationId xmlns:a16="http://schemas.microsoft.com/office/drawing/2014/main" xmlns="" id="{A064B767-0C67-4E78-8E02-6E4F4D6E0D0D}"/>
               </a:ext>
             </a:extLst>
           </p:cNvPr>
@@ -2029,7 +2029,7 @@
           <a:p>
             <a:fld id="{CC7C2768-A18B-433E-B893-6D4C6EFBD913}" type="slidenum">
               <a:rPr lang="de-DE" smtClean="0"/>
-              <a:t>‹Nr.›</a:t>
+              <a:t>‹#›</a:t>
             </a:fld>
             <a:endParaRPr lang="de-DE"/>
           </a:p>
@@ -2070,7 +2070,7 @@
           <p:cNvPr id="2" name="Datumsplatzhalter 1">
             <a:extLst>
               <a:ext uri="{FF2B5EF4-FFF2-40B4-BE49-F238E27FC236}">
-                <a16:creationId xmlns:a16="http://schemas.microsoft.com/office/drawing/2014/main" id="{EAB7CFF6-ACBB-45D7-95A2-1CC829B2159E}"/>
+                <a16:creationId xmlns:a16="http://schemas.microsoft.com/office/drawing/2014/main" xmlns="" id="{EAB7CFF6-ACBB-45D7-95A2-1CC829B2159E}"/>
               </a:ext>
             </a:extLst>
           </p:cNvPr>
@@ -2099,7 +2099,7 @@
           <p:cNvPr id="3" name="Fußzeilenplatzhalter 2">
             <a:extLst>
               <a:ext uri="{FF2B5EF4-FFF2-40B4-BE49-F238E27FC236}">
-                <a16:creationId xmlns:a16="http://schemas.microsoft.com/office/drawing/2014/main" id="{C9859E0F-BEFB-48A3-B221-3B1BA54E7527}"/>
+                <a16:creationId xmlns:a16="http://schemas.microsoft.com/office/drawing/2014/main" xmlns="" id="{C9859E0F-BEFB-48A3-B221-3B1BA54E7527}"/>
               </a:ext>
             </a:extLst>
           </p:cNvPr>
@@ -2124,7 +2124,7 @@
           <p:cNvPr id="4" name="Foliennummernplatzhalter 3">
             <a:extLst>
               <a:ext uri="{FF2B5EF4-FFF2-40B4-BE49-F238E27FC236}">
-                <a16:creationId xmlns:a16="http://schemas.microsoft.com/office/drawing/2014/main" id="{66FB12B4-5D20-41F8-A9EE-7D0F659C311A}"/>
+                <a16:creationId xmlns:a16="http://schemas.microsoft.com/office/drawing/2014/main" xmlns="" id="{66FB12B4-5D20-41F8-A9EE-7D0F659C311A}"/>
               </a:ext>
             </a:extLst>
           </p:cNvPr>
@@ -2142,7 +2142,7 @@
           <a:p>
             <a:fld id="{CC7C2768-A18B-433E-B893-6D4C6EFBD913}" type="slidenum">
               <a:rPr lang="de-DE" smtClean="0"/>
-              <a:t>‹Nr.›</a:t>
+              <a:t>‹#›</a:t>
             </a:fld>
             <a:endParaRPr lang="de-DE"/>
           </a:p>
@@ -2183,7 +2183,7 @@
           <p:cNvPr id="2" name="Titel 1">
             <a:extLst>
               <a:ext uri="{FF2B5EF4-FFF2-40B4-BE49-F238E27FC236}">
-                <a16:creationId xmlns:a16="http://schemas.microsoft.com/office/drawing/2014/main" id="{C15B2BCB-14B4-47DE-8BF5-7FA7CC8C1CD1}"/>
+                <a16:creationId xmlns:a16="http://schemas.microsoft.com/office/drawing/2014/main" xmlns="" id="{C15B2BCB-14B4-47DE-8BF5-7FA7CC8C1CD1}"/>
               </a:ext>
             </a:extLst>
           </p:cNvPr>
@@ -2220,7 +2220,7 @@
           <p:cNvPr id="3" name="Inhaltsplatzhalter 2">
             <a:extLst>
               <a:ext uri="{FF2B5EF4-FFF2-40B4-BE49-F238E27FC236}">
-                <a16:creationId xmlns:a16="http://schemas.microsoft.com/office/drawing/2014/main" id="{AA195451-5543-44BB-9CB3-0085E5E3E074}"/>
+                <a16:creationId xmlns:a16="http://schemas.microsoft.com/office/drawing/2014/main" xmlns="" id="{AA195451-5543-44BB-9CB3-0085E5E3E074}"/>
               </a:ext>
             </a:extLst>
           </p:cNvPr>
@@ -2310,7 +2310,7 @@
           <p:cNvPr id="4" name="Textplatzhalter 3">
             <a:extLst>
               <a:ext uri="{FF2B5EF4-FFF2-40B4-BE49-F238E27FC236}">
-                <a16:creationId xmlns:a16="http://schemas.microsoft.com/office/drawing/2014/main" id="{BD4C7D5C-6593-46CB-9277-E234A3A6962B}"/>
+                <a16:creationId xmlns:a16="http://schemas.microsoft.com/office/drawing/2014/main" xmlns="" id="{BD4C7D5C-6593-46CB-9277-E234A3A6962B}"/>
               </a:ext>
             </a:extLst>
           </p:cNvPr>
@@ -2381,7 +2381,7 @@
           <p:cNvPr id="5" name="Datumsplatzhalter 4">
             <a:extLst>
               <a:ext uri="{FF2B5EF4-FFF2-40B4-BE49-F238E27FC236}">
-                <a16:creationId xmlns:a16="http://schemas.microsoft.com/office/drawing/2014/main" id="{0F118CDC-B75D-451A-93A8-61C6861A6C35}"/>
+                <a16:creationId xmlns:a16="http://schemas.microsoft.com/office/drawing/2014/main" xmlns="" id="{0F118CDC-B75D-451A-93A8-61C6861A6C35}"/>
               </a:ext>
             </a:extLst>
           </p:cNvPr>
@@ -2410,7 +2410,7 @@
           <p:cNvPr id="6" name="Fußzeilenplatzhalter 5">
             <a:extLst>
               <a:ext uri="{FF2B5EF4-FFF2-40B4-BE49-F238E27FC236}">
-                <a16:creationId xmlns:a16="http://schemas.microsoft.com/office/drawing/2014/main" id="{A42A75DD-D55F-4FCD-AF54-ABFB28568A27}"/>
+                <a16:creationId xmlns:a16="http://schemas.microsoft.com/office/drawing/2014/main" xmlns="" id="{A42A75DD-D55F-4FCD-AF54-ABFB28568A27}"/>
               </a:ext>
             </a:extLst>
           </p:cNvPr>
@@ -2435,7 +2435,7 @@
           <p:cNvPr id="7" name="Foliennummernplatzhalter 6">
             <a:extLst>
               <a:ext uri="{FF2B5EF4-FFF2-40B4-BE49-F238E27FC236}">
-                <a16:creationId xmlns:a16="http://schemas.microsoft.com/office/drawing/2014/main" id="{5CE292AD-15C3-4759-BDA2-9C1CB9260454}"/>
+                <a16:creationId xmlns:a16="http://schemas.microsoft.com/office/drawing/2014/main" xmlns="" id="{5CE292AD-15C3-4759-BDA2-9C1CB9260454}"/>
               </a:ext>
             </a:extLst>
           </p:cNvPr>
@@ -2453,7 +2453,7 @@
           <a:p>
             <a:fld id="{CC7C2768-A18B-433E-B893-6D4C6EFBD913}" type="slidenum">
               <a:rPr lang="de-DE" smtClean="0"/>
-              <a:t>‹Nr.›</a:t>
+              <a:t>‹#›</a:t>
             </a:fld>
             <a:endParaRPr lang="de-DE"/>
           </a:p>
@@ -2494,7 +2494,7 @@
           <p:cNvPr id="2" name="Titel 1">
             <a:extLst>
               <a:ext uri="{FF2B5EF4-FFF2-40B4-BE49-F238E27FC236}">
-                <a16:creationId xmlns:a16="http://schemas.microsoft.com/office/drawing/2014/main" id="{A6E4DE3F-F159-430E-B361-DE4C298E4DCB}"/>
+                <a16:creationId xmlns:a16="http://schemas.microsoft.com/office/drawing/2014/main" xmlns="" id="{A6E4DE3F-F159-430E-B361-DE4C298E4DCB}"/>
               </a:ext>
             </a:extLst>
           </p:cNvPr>
@@ -2531,7 +2531,7 @@
           <p:cNvPr id="3" name="Bildplatzhalter 2">
             <a:extLst>
               <a:ext uri="{FF2B5EF4-FFF2-40B4-BE49-F238E27FC236}">
-                <a16:creationId xmlns:a16="http://schemas.microsoft.com/office/drawing/2014/main" id="{38F07FA9-45DC-4C4E-9D78-61954C1C5FD4}"/>
+                <a16:creationId xmlns:a16="http://schemas.microsoft.com/office/drawing/2014/main" xmlns="" id="{38F07FA9-45DC-4C4E-9D78-61954C1C5FD4}"/>
               </a:ext>
             </a:extLst>
           </p:cNvPr>
@@ -2598,7 +2598,7 @@
           <p:cNvPr id="4" name="Textplatzhalter 3">
             <a:extLst>
               <a:ext uri="{FF2B5EF4-FFF2-40B4-BE49-F238E27FC236}">
-                <a16:creationId xmlns:a16="http://schemas.microsoft.com/office/drawing/2014/main" id="{8C309AB3-B914-4E24-8FDF-FC4B7E1ACBAB}"/>
+                <a16:creationId xmlns:a16="http://schemas.microsoft.com/office/drawing/2014/main" xmlns="" id="{8C309AB3-B914-4E24-8FDF-FC4B7E1ACBAB}"/>
               </a:ext>
             </a:extLst>
           </p:cNvPr>
@@ -2669,7 +2669,7 @@
           <p:cNvPr id="5" name="Datumsplatzhalter 4">
             <a:extLst>
               <a:ext uri="{FF2B5EF4-FFF2-40B4-BE49-F238E27FC236}">
-                <a16:creationId xmlns:a16="http://schemas.microsoft.com/office/drawing/2014/main" id="{72E18500-AC25-4B23-97AC-51D18B725B47}"/>
+                <a16:creationId xmlns:a16="http://schemas.microsoft.com/office/drawing/2014/main" xmlns="" id="{72E18500-AC25-4B23-97AC-51D18B725B47}"/>
               </a:ext>
             </a:extLst>
           </p:cNvPr>
@@ -2698,7 +2698,7 @@
           <p:cNvPr id="6" name="Fußzeilenplatzhalter 5">
             <a:extLst>
               <a:ext uri="{FF2B5EF4-FFF2-40B4-BE49-F238E27FC236}">
-                <a16:creationId xmlns:a16="http://schemas.microsoft.com/office/drawing/2014/main" id="{C391A1D9-71DB-4780-8AF2-C2963A7BCB8C}"/>
+                <a16:creationId xmlns:a16="http://schemas.microsoft.com/office/drawing/2014/main" xmlns="" id="{C391A1D9-71DB-4780-8AF2-C2963A7BCB8C}"/>
               </a:ext>
             </a:extLst>
           </p:cNvPr>
@@ -2723,7 +2723,7 @@
           <p:cNvPr id="7" name="Foliennummernplatzhalter 6">
             <a:extLst>
               <a:ext uri="{FF2B5EF4-FFF2-40B4-BE49-F238E27FC236}">
-                <a16:creationId xmlns:a16="http://schemas.microsoft.com/office/drawing/2014/main" id="{EA3DDF99-AFD1-4967-A36B-509E41EC7EC6}"/>
+                <a16:creationId xmlns:a16="http://schemas.microsoft.com/office/drawing/2014/main" xmlns="" id="{EA3DDF99-AFD1-4967-A36B-509E41EC7EC6}"/>
               </a:ext>
             </a:extLst>
           </p:cNvPr>
@@ -2741,7 +2741,7 @@
           <a:p>
             <a:fld id="{CC7C2768-A18B-433E-B893-6D4C6EFBD913}" type="slidenum">
               <a:rPr lang="de-DE" smtClean="0"/>
-              <a:t>‹Nr.›</a:t>
+              <a:t>‹#›</a:t>
             </a:fld>
             <a:endParaRPr lang="de-DE"/>
           </a:p>
@@ -2787,7 +2787,7 @@
           <p:cNvPr id="2" name="Titelplatzhalter 1">
             <a:extLst>
               <a:ext uri="{FF2B5EF4-FFF2-40B4-BE49-F238E27FC236}">
-                <a16:creationId xmlns:a16="http://schemas.microsoft.com/office/drawing/2014/main" id="{4E6686F4-A6CE-4625-9E8E-EA781C7A2C19}"/>
+                <a16:creationId xmlns:a16="http://schemas.microsoft.com/office/drawing/2014/main" xmlns="" id="{4E6686F4-A6CE-4625-9E8E-EA781C7A2C19}"/>
               </a:ext>
             </a:extLst>
           </p:cNvPr>
@@ -2825,7 +2825,7 @@
           <p:cNvPr id="3" name="Textplatzhalter 2">
             <a:extLst>
               <a:ext uri="{FF2B5EF4-FFF2-40B4-BE49-F238E27FC236}">
-                <a16:creationId xmlns:a16="http://schemas.microsoft.com/office/drawing/2014/main" id="{7904807A-D78F-4B3E-982B-CB1C2765EF4C}"/>
+                <a16:creationId xmlns:a16="http://schemas.microsoft.com/office/drawing/2014/main" xmlns="" id="{7904807A-D78F-4B3E-982B-CB1C2765EF4C}"/>
               </a:ext>
             </a:extLst>
           </p:cNvPr>
@@ -2892,7 +2892,7 @@
           <p:cNvPr id="4" name="Datumsplatzhalter 3">
             <a:extLst>
               <a:ext uri="{FF2B5EF4-FFF2-40B4-BE49-F238E27FC236}">
-                <a16:creationId xmlns:a16="http://schemas.microsoft.com/office/drawing/2014/main" id="{E948E7C7-A2DD-41D5-90AD-98831FFF5226}"/>
+                <a16:creationId xmlns:a16="http://schemas.microsoft.com/office/drawing/2014/main" xmlns="" id="{E948E7C7-A2DD-41D5-90AD-98831FFF5226}"/>
               </a:ext>
             </a:extLst>
           </p:cNvPr>
@@ -2939,7 +2939,7 @@
           <p:cNvPr id="5" name="Fußzeilenplatzhalter 4">
             <a:extLst>
               <a:ext uri="{FF2B5EF4-FFF2-40B4-BE49-F238E27FC236}">
-                <a16:creationId xmlns:a16="http://schemas.microsoft.com/office/drawing/2014/main" id="{3D0B629D-5654-425F-B014-941B71CDC102}"/>
+                <a16:creationId xmlns:a16="http://schemas.microsoft.com/office/drawing/2014/main" xmlns="" id="{3D0B629D-5654-425F-B014-941B71CDC102}"/>
               </a:ext>
             </a:extLst>
           </p:cNvPr>
@@ -2982,7 +2982,7 @@
           <p:cNvPr id="6" name="Foliennummernplatzhalter 5">
             <a:extLst>
               <a:ext uri="{FF2B5EF4-FFF2-40B4-BE49-F238E27FC236}">
-                <a16:creationId xmlns:a16="http://schemas.microsoft.com/office/drawing/2014/main" id="{08A7FD97-63D6-4F0A-84A7-F5F9F2909C02}"/>
+                <a16:creationId xmlns:a16="http://schemas.microsoft.com/office/drawing/2014/main" xmlns="" id="{08A7FD97-63D6-4F0A-84A7-F5F9F2909C02}"/>
               </a:ext>
             </a:extLst>
           </p:cNvPr>
@@ -3018,7 +3018,7 @@
           <a:p>
             <a:fld id="{CC7C2768-A18B-433E-B893-6D4C6EFBD913}" type="slidenum">
               <a:rPr lang="de-DE" smtClean="0"/>
-              <a:t>‹Nr.›</a:t>
+              <a:t>‹#›</a:t>
             </a:fld>
             <a:endParaRPr lang="de-DE"/>
           </a:p>
@@ -3350,7 +3350,7 @@
           <p:cNvPr id="4" name="Rechteck 3">
             <a:extLst>
               <a:ext uri="{FF2B5EF4-FFF2-40B4-BE49-F238E27FC236}">
-                <a16:creationId xmlns:a16="http://schemas.microsoft.com/office/drawing/2014/main" id="{585130E2-356B-436B-9BE8-D41B9A5EAB54}"/>
+                <a16:creationId xmlns:a16="http://schemas.microsoft.com/office/drawing/2014/main" xmlns="" id="{585130E2-356B-436B-9BE8-D41B9A5EAB54}"/>
               </a:ext>
             </a:extLst>
           </p:cNvPr>
@@ -3399,7 +3399,7 @@
           <p:cNvPr id="5" name="Textfeld 4">
             <a:extLst>
               <a:ext uri="{FF2B5EF4-FFF2-40B4-BE49-F238E27FC236}">
-                <a16:creationId xmlns:a16="http://schemas.microsoft.com/office/drawing/2014/main" id="{31B59E8F-BD86-49CD-87FD-0A9A9CE21D02}"/>
+                <a16:creationId xmlns:a16="http://schemas.microsoft.com/office/drawing/2014/main" xmlns="" id="{31B59E8F-BD86-49CD-87FD-0A9A9CE21D02}"/>
               </a:ext>
             </a:extLst>
           </p:cNvPr>
@@ -3409,7 +3409,7 @@
         <p:spPr>
           <a:xfrm>
             <a:off x="687900" y="1870745"/>
-            <a:ext cx="3639330" cy="1323439"/>
+            <a:ext cx="3737433" cy="1323439"/>
           </a:xfrm>
           <a:prstGeom prst="rect">
             <a:avLst/>
@@ -3428,11 +3428,15 @@
             </a:pPr>
             <a:r>
               <a:rPr lang="de-DE" sz="1600" dirty="0"/>
-              <a:t>Wer darf sich in die Software </a:t>
-            </a:r>
-            <a:r>
-              <a:rPr lang="de-DE" sz="1600" dirty="0" err="1"/>
-              <a:t>einlogen</a:t>
+              <a:t>Wer darf sich in die </a:t>
+            </a:r>
+            <a:r>
+              <a:rPr lang="de-DE" sz="1600"/>
+              <a:t>Software </a:t>
+            </a:r>
+            <a:r>
+              <a:rPr lang="de-DE" sz="1600" smtClean="0"/>
+              <a:t>einloggen</a:t>
             </a:r>
             <a:endParaRPr lang="de-DE" sz="1600" dirty="0"/>
           </a:p>
@@ -3483,7 +3487,7 @@
           <p:cNvPr id="6" name="Rechteck 5">
             <a:extLst>
               <a:ext uri="{FF2B5EF4-FFF2-40B4-BE49-F238E27FC236}">
-                <a16:creationId xmlns:a16="http://schemas.microsoft.com/office/drawing/2014/main" id="{AE6465DD-7406-47E6-B610-E10D1EEEF145}"/>
+                <a16:creationId xmlns:a16="http://schemas.microsoft.com/office/drawing/2014/main" xmlns="" id="{AE6465DD-7406-47E6-B610-E10D1EEEF145}"/>
               </a:ext>
             </a:extLst>
           </p:cNvPr>
@@ -3532,7 +3536,7 @@
           <p:cNvPr id="7" name="Textfeld 6">
             <a:extLst>
               <a:ext uri="{FF2B5EF4-FFF2-40B4-BE49-F238E27FC236}">
-                <a16:creationId xmlns:a16="http://schemas.microsoft.com/office/drawing/2014/main" id="{205E9BB6-BDB7-4557-A888-039153E46528}"/>
+                <a16:creationId xmlns:a16="http://schemas.microsoft.com/office/drawing/2014/main" xmlns="" id="{205E9BB6-BDB7-4557-A888-039153E46528}"/>
               </a:ext>
             </a:extLst>
           </p:cNvPr>
@@ -3613,7 +3617,7 @@
           <p:cNvPr id="8" name="Rechteck 7">
             <a:extLst>
               <a:ext uri="{FF2B5EF4-FFF2-40B4-BE49-F238E27FC236}">
-                <a16:creationId xmlns:a16="http://schemas.microsoft.com/office/drawing/2014/main" id="{C6DEA7F6-8E32-47AB-BCE2-277A48E4ACB8}"/>
+                <a16:creationId xmlns:a16="http://schemas.microsoft.com/office/drawing/2014/main" xmlns="" id="{C6DEA7F6-8E32-47AB-BCE2-277A48E4ACB8}"/>
               </a:ext>
             </a:extLst>
           </p:cNvPr>
@@ -3662,7 +3666,7 @@
           <p:cNvPr id="9" name="Textfeld 8">
             <a:extLst>
               <a:ext uri="{FF2B5EF4-FFF2-40B4-BE49-F238E27FC236}">
-                <a16:creationId xmlns:a16="http://schemas.microsoft.com/office/drawing/2014/main" id="{44DA6EB6-1D4F-4E14-A975-6E6FF25598C5}"/>
+                <a16:creationId xmlns:a16="http://schemas.microsoft.com/office/drawing/2014/main" xmlns="" id="{44DA6EB6-1D4F-4E14-A975-6E6FF25598C5}"/>
               </a:ext>
             </a:extLst>
           </p:cNvPr>
@@ -3728,7 +3732,7 @@
           <p:cNvPr id="10" name="Rechteck 9">
             <a:extLst>
               <a:ext uri="{FF2B5EF4-FFF2-40B4-BE49-F238E27FC236}">
-                <a16:creationId xmlns:a16="http://schemas.microsoft.com/office/drawing/2014/main" id="{491F5CB9-413F-41DC-8981-44BFF2E71B57}"/>
+                <a16:creationId xmlns:a16="http://schemas.microsoft.com/office/drawing/2014/main" xmlns="" id="{491F5CB9-413F-41DC-8981-44BFF2E71B57}"/>
               </a:ext>
             </a:extLst>
           </p:cNvPr>
@@ -3777,7 +3781,7 @@
           <p:cNvPr id="11" name="Textfeld 10">
             <a:extLst>
               <a:ext uri="{FF2B5EF4-FFF2-40B4-BE49-F238E27FC236}">
-                <a16:creationId xmlns:a16="http://schemas.microsoft.com/office/drawing/2014/main" id="{F0CFE13D-D53F-4FBB-AB33-628A51E52A5C}"/>
+                <a16:creationId xmlns:a16="http://schemas.microsoft.com/office/drawing/2014/main" xmlns="" id="{F0CFE13D-D53F-4FBB-AB33-628A51E52A5C}"/>
               </a:ext>
             </a:extLst>
           </p:cNvPr>
@@ -3856,7 +3860,7 @@
           <p:cNvPr id="2" name="Titel 1">
             <a:extLst>
               <a:ext uri="{FF2B5EF4-FFF2-40B4-BE49-F238E27FC236}">
-                <a16:creationId xmlns:a16="http://schemas.microsoft.com/office/drawing/2014/main" id="{EBCF9266-74EA-4182-BDB9-2386F9D5296E}"/>
+                <a16:creationId xmlns:a16="http://schemas.microsoft.com/office/drawing/2014/main" xmlns="" id="{EBCF9266-74EA-4182-BDB9-2386F9D5296E}"/>
               </a:ext>
             </a:extLst>
           </p:cNvPr>
@@ -3884,7 +3888,7 @@
           <p:cNvPr id="4" name="Rechteck 3">
             <a:extLst>
               <a:ext uri="{FF2B5EF4-FFF2-40B4-BE49-F238E27FC236}">
-                <a16:creationId xmlns:a16="http://schemas.microsoft.com/office/drawing/2014/main" id="{71E0604C-A18C-4D11-97E3-1EBD38CCDDA2}"/>
+                <a16:creationId xmlns:a16="http://schemas.microsoft.com/office/drawing/2014/main" xmlns="" id="{71E0604C-A18C-4D11-97E3-1EBD38CCDDA2}"/>
               </a:ext>
             </a:extLst>
           </p:cNvPr>
@@ -3934,7 +3938,7 @@
           <p:cNvPr id="5" name="Rechteck 4">
             <a:extLst>
               <a:ext uri="{FF2B5EF4-FFF2-40B4-BE49-F238E27FC236}">
-                <a16:creationId xmlns:a16="http://schemas.microsoft.com/office/drawing/2014/main" id="{BB131D86-0A1A-467F-9583-639287C03FDB}"/>
+                <a16:creationId xmlns:a16="http://schemas.microsoft.com/office/drawing/2014/main" xmlns="" id="{BB131D86-0A1A-467F-9583-639287C03FDB}"/>
               </a:ext>
             </a:extLst>
           </p:cNvPr>
@@ -3984,7 +3988,7 @@
           <p:cNvPr id="6" name="Rechteck 5">
             <a:extLst>
               <a:ext uri="{FF2B5EF4-FFF2-40B4-BE49-F238E27FC236}">
-                <a16:creationId xmlns:a16="http://schemas.microsoft.com/office/drawing/2014/main" id="{1895AE1C-EF84-4B16-BB4E-9A7F6E5A07CA}"/>
+                <a16:creationId xmlns:a16="http://schemas.microsoft.com/office/drawing/2014/main" xmlns="" id="{1895AE1C-EF84-4B16-BB4E-9A7F6E5A07CA}"/>
               </a:ext>
             </a:extLst>
           </p:cNvPr>
@@ -4034,7 +4038,7 @@
           <p:cNvPr id="7" name="Rechteck 6">
             <a:extLst>
               <a:ext uri="{FF2B5EF4-FFF2-40B4-BE49-F238E27FC236}">
-                <a16:creationId xmlns:a16="http://schemas.microsoft.com/office/drawing/2014/main" id="{486D8F13-7B9C-4E41-8548-28B31CAC6708}"/>
+                <a16:creationId xmlns:a16="http://schemas.microsoft.com/office/drawing/2014/main" xmlns="" id="{486D8F13-7B9C-4E41-8548-28B31CAC6708}"/>
               </a:ext>
             </a:extLst>
           </p:cNvPr>
@@ -4084,7 +4088,7 @@
           <p:cNvPr id="8" name="Rechteck 7">
             <a:extLst>
               <a:ext uri="{FF2B5EF4-FFF2-40B4-BE49-F238E27FC236}">
-                <a16:creationId xmlns:a16="http://schemas.microsoft.com/office/drawing/2014/main" id="{B5FCCCC2-3E16-4830-8ABF-F03804AAE88F}"/>
+                <a16:creationId xmlns:a16="http://schemas.microsoft.com/office/drawing/2014/main" xmlns="" id="{B5FCCCC2-3E16-4830-8ABF-F03804AAE88F}"/>
               </a:ext>
             </a:extLst>
           </p:cNvPr>
@@ -4134,7 +4138,7 @@
           <p:cNvPr id="10" name="Rechteck 9">
             <a:extLst>
               <a:ext uri="{FF2B5EF4-FFF2-40B4-BE49-F238E27FC236}">
-                <a16:creationId xmlns:a16="http://schemas.microsoft.com/office/drawing/2014/main" id="{34DF93A0-5855-4B8B-8C7C-140998CA00E6}"/>
+                <a16:creationId xmlns:a16="http://schemas.microsoft.com/office/drawing/2014/main" xmlns="" id="{34DF93A0-5855-4B8B-8C7C-140998CA00E6}"/>
               </a:ext>
             </a:extLst>
           </p:cNvPr>
@@ -4184,7 +4188,7 @@
           <p:cNvPr id="9" name="Rechteck 8">
             <a:extLst>
               <a:ext uri="{FF2B5EF4-FFF2-40B4-BE49-F238E27FC236}">
-                <a16:creationId xmlns:a16="http://schemas.microsoft.com/office/drawing/2014/main" id="{D4F46D47-8E37-41AB-A099-27FA856333A9}"/>
+                <a16:creationId xmlns:a16="http://schemas.microsoft.com/office/drawing/2014/main" xmlns="" id="{D4F46D47-8E37-41AB-A099-27FA856333A9}"/>
               </a:ext>
             </a:extLst>
           </p:cNvPr>
@@ -4233,7 +4237,7 @@
           <p:cNvPr id="11" name="Rechteck 10">
             <a:extLst>
               <a:ext uri="{FF2B5EF4-FFF2-40B4-BE49-F238E27FC236}">
-                <a16:creationId xmlns:a16="http://schemas.microsoft.com/office/drawing/2014/main" id="{59732A41-3393-4C55-AF21-27EF19CE83E9}"/>
+                <a16:creationId xmlns:a16="http://schemas.microsoft.com/office/drawing/2014/main" xmlns="" id="{59732A41-3393-4C55-AF21-27EF19CE83E9}"/>
               </a:ext>
             </a:extLst>
           </p:cNvPr>
@@ -4283,7 +4287,7 @@
           <p:cNvPr id="12" name="Rechteck 11">
             <a:extLst>
               <a:ext uri="{FF2B5EF4-FFF2-40B4-BE49-F238E27FC236}">
-                <a16:creationId xmlns:a16="http://schemas.microsoft.com/office/drawing/2014/main" id="{2B798D15-3FF1-4028-8CA4-8857349B5E75}"/>
+                <a16:creationId xmlns:a16="http://schemas.microsoft.com/office/drawing/2014/main" xmlns="" id="{2B798D15-3FF1-4028-8CA4-8857349B5E75}"/>
               </a:ext>
             </a:extLst>
           </p:cNvPr>
@@ -4363,7 +4367,7 @@
           <p:cNvPr id="2" name="Titel 1">
             <a:extLst>
               <a:ext uri="{FF2B5EF4-FFF2-40B4-BE49-F238E27FC236}">
-                <a16:creationId xmlns:a16="http://schemas.microsoft.com/office/drawing/2014/main" id="{3147E4C3-B12C-4E1D-AA11-AF186172D6F5}"/>
+                <a16:creationId xmlns:a16="http://schemas.microsoft.com/office/drawing/2014/main" xmlns="" id="{3147E4C3-B12C-4E1D-AA11-AF186172D6F5}"/>
               </a:ext>
             </a:extLst>
           </p:cNvPr>
@@ -4391,7 +4395,7 @@
           <p:cNvPr id="3" name="Inhaltsplatzhalter 2">
             <a:extLst>
               <a:ext uri="{FF2B5EF4-FFF2-40B4-BE49-F238E27FC236}">
-                <a16:creationId xmlns:a16="http://schemas.microsoft.com/office/drawing/2014/main" id="{4A93CF13-AA6E-4C26-9C31-1FD5D910355C}"/>
+                <a16:creationId xmlns:a16="http://schemas.microsoft.com/office/drawing/2014/main" xmlns="" id="{4A93CF13-AA6E-4C26-9C31-1FD5D910355C}"/>
               </a:ext>
             </a:extLst>
           </p:cNvPr>
@@ -4446,7 +4450,7 @@
           <p:cNvPr id="2" name="Titel 1">
             <a:extLst>
               <a:ext uri="{FF2B5EF4-FFF2-40B4-BE49-F238E27FC236}">
-                <a16:creationId xmlns:a16="http://schemas.microsoft.com/office/drawing/2014/main" id="{303EB917-3DD5-4EC8-8793-DD17AAFB258D}"/>
+                <a16:creationId xmlns:a16="http://schemas.microsoft.com/office/drawing/2014/main" xmlns="" id="{303EB917-3DD5-4EC8-8793-DD17AAFB258D}"/>
               </a:ext>
             </a:extLst>
           </p:cNvPr>
@@ -4474,7 +4478,7 @@
           <p:cNvPr id="3" name="Inhaltsplatzhalter 2">
             <a:extLst>
               <a:ext uri="{FF2B5EF4-FFF2-40B4-BE49-F238E27FC236}">
-                <a16:creationId xmlns:a16="http://schemas.microsoft.com/office/drawing/2014/main" id="{7670A64C-A9E8-437F-9628-949A1DA71DE3}"/>
+                <a16:creationId xmlns:a16="http://schemas.microsoft.com/office/drawing/2014/main" xmlns="" id="{7670A64C-A9E8-437F-9628-949A1DA71DE3}"/>
               </a:ext>
             </a:extLst>
           </p:cNvPr>
@@ -4529,7 +4533,7 @@
           <p:cNvPr id="2" name="Titel 1">
             <a:extLst>
               <a:ext uri="{FF2B5EF4-FFF2-40B4-BE49-F238E27FC236}">
-                <a16:creationId xmlns:a16="http://schemas.microsoft.com/office/drawing/2014/main" id="{60435DE7-4E07-4AC4-892F-DFD3027E1EFF}"/>
+                <a16:creationId xmlns:a16="http://schemas.microsoft.com/office/drawing/2014/main" xmlns="" id="{60435DE7-4E07-4AC4-892F-DFD3027E1EFF}"/>
               </a:ext>
             </a:extLst>
           </p:cNvPr>
@@ -4608,7 +4612,7 @@
     </a:clrScheme>
     <a:fontScheme name="Office">
       <a:majorFont>
-        <a:latin typeface="Calibri Light" panose="020F0302020204030204"/>
+        <a:latin typeface="Calibri Light"/>
         <a:ea typeface=""/>
         <a:cs typeface=""/>
         <a:font script="Jpan" typeface="游ゴシック Light"/>
@@ -4660,7 +4664,7 @@
         <a:font script="Tfng" typeface="Ebrima"/>
       </a:majorFont>
       <a:minorFont>
-        <a:latin typeface="Calibri" panose="020F0502020204030204"/>
+        <a:latin typeface="Calibri"/>
         <a:ea typeface=""/>
         <a:cs typeface=""/>
         <a:font script="Jpan" typeface="游ゴシック"/>
@@ -4854,7 +4858,7 @@
   <a:extraClrSchemeLst/>
   <a:extLst>
     <a:ext uri="{05A4C25C-085E-4340-85A3-A5531E510DB2}">
-      <thm15:themeFamily xmlns:thm15="http://schemas.microsoft.com/office/thememl/2012/main" name="Office Theme" id="{62F939B6-93AF-4DB8-9C6B-D6C7DFDC589F}" vid="{4A3C46E8-61CC-4603-A589-7422A47A8E4A}"/>
+      <thm15:themeFamily xmlns:thm15="http://schemas.microsoft.com/office/thememl/2012/main" xmlns="" name="Office Theme" id="{62F939B6-93AF-4DB8-9C6B-D6C7DFDC589F}" vid="{4A3C46E8-61CC-4603-A589-7422A47A8E4A}"/>
     </a:ext>
   </a:extLst>
 </a:theme>

</xml_diff>